<commit_message>
updating routing and history slides
</commit_message>
<xml_diff>
--- a/backbone.presentation.pptx
+++ b/backbone.presentation.pptx
@@ -5,7 +5,7 @@
     <p:sldMasterId id="2147485450" r:id="rId1"/>
   </p:sldMasterIdLst>
   <p:notesMasterIdLst>
-    <p:notesMasterId r:id="rId17"/>
+    <p:notesMasterId r:id="rId18"/>
   </p:notesMasterIdLst>
   <p:sldIdLst>
     <p:sldId id="259" r:id="rId2"/>
@@ -16,13 +16,14 @@
     <p:sldId id="267" r:id="rId7"/>
     <p:sldId id="260" r:id="rId8"/>
     <p:sldId id="268" r:id="rId9"/>
-    <p:sldId id="275" r:id="rId10"/>
-    <p:sldId id="257" r:id="rId11"/>
-    <p:sldId id="271" r:id="rId12"/>
-    <p:sldId id="269" r:id="rId13"/>
-    <p:sldId id="261" r:id="rId14"/>
-    <p:sldId id="262" r:id="rId15"/>
-    <p:sldId id="264" r:id="rId16"/>
+    <p:sldId id="276" r:id="rId10"/>
+    <p:sldId id="275" r:id="rId11"/>
+    <p:sldId id="257" r:id="rId12"/>
+    <p:sldId id="271" r:id="rId13"/>
+    <p:sldId id="269" r:id="rId14"/>
+    <p:sldId id="261" r:id="rId15"/>
+    <p:sldId id="262" r:id="rId16"/>
+    <p:sldId id="264" r:id="rId17"/>
   </p:sldIdLst>
   <p:sldSz cx="9144000" cy="6858000" type="screen4x3"/>
   <p:notesSz cx="6858000" cy="9144000"/>
@@ -206,7 +207,7 @@
           <a:p>
             <a:fld id="{6869F6E2-B41F-DD42-A35B-DFD13F95E270}" type="datetimeFigureOut">
               <a:rPr lang="en-US" smtClean="0"/>
-              <a:t>11/1/11</a:t>
+              <a:t>11/3/11</a:t>
             </a:fld>
             <a:endParaRPr lang="en-US"/>
           </a:p>
@@ -474,6 +475,108 @@
 </p:notesMaster>
 </file>
 
+<file path=ppt/notesSlides/notesSlide1.xml><?xml version="1.0" encoding="utf-8"?>
+<p:notes xmlns:a="http://schemas.openxmlformats.org/drawingml/2006/main" xmlns:r="http://schemas.openxmlformats.org/officeDocument/2006/relationships" xmlns:p="http://schemas.openxmlformats.org/presentationml/2006/main">
+  <p:cSld>
+    <p:spTree>
+      <p:nvGrpSpPr>
+        <p:cNvPr id="1" name=""/>
+        <p:cNvGrpSpPr/>
+        <p:nvPr/>
+      </p:nvGrpSpPr>
+      <p:grpSpPr>
+        <a:xfrm>
+          <a:off x="0" y="0"/>
+          <a:ext cx="0" cy="0"/>
+          <a:chOff x="0" y="0"/>
+          <a:chExt cx="0" cy="0"/>
+        </a:xfrm>
+      </p:grpSpPr>
+      <p:sp>
+        <p:nvSpPr>
+          <p:cNvPr id="2" name="Slide Image Placeholder 1"/>
+          <p:cNvSpPr>
+            <a:spLocks noGrp="1" noRot="1" noChangeAspect="1"/>
+          </p:cNvSpPr>
+          <p:nvPr>
+            <p:ph type="sldImg"/>
+          </p:nvPr>
+        </p:nvSpPr>
+        <p:spPr/>
+      </p:sp>
+      <p:sp>
+        <p:nvSpPr>
+          <p:cNvPr id="3" name="Notes Placeholder 2"/>
+          <p:cNvSpPr>
+            <a:spLocks noGrp="1"/>
+          </p:cNvSpPr>
+          <p:nvPr>
+            <p:ph type="body" idx="1"/>
+          </p:nvPr>
+        </p:nvSpPr>
+        <p:spPr/>
+        <p:txBody>
+          <a:bodyPr/>
+          <a:lstStyle/>
+          <a:p>
+            <a:r>
+              <a:rPr lang="en-US" dirty="0" smtClean="0"/>
+              <a:t>Kyle Simpson’s discussion from earlier today</a:t>
+            </a:r>
+          </a:p>
+          <a:p>
+            <a:r>
+              <a:rPr lang="en-US" dirty="0" smtClean="0"/>
+              <a:t>Backbone</a:t>
+            </a:r>
+            <a:r>
+              <a:rPr lang="en-US" baseline="0" dirty="0" smtClean="0"/>
+              <a:t> has a fallback to use hash routes for browsers that don’t support the history </a:t>
+            </a:r>
+            <a:r>
+              <a:rPr lang="en-US" baseline="0" dirty="0" err="1" smtClean="0"/>
+              <a:t>api</a:t>
+            </a:r>
+            <a:endParaRPr lang="en-US" dirty="0" smtClean="0"/>
+          </a:p>
+        </p:txBody>
+      </p:sp>
+      <p:sp>
+        <p:nvSpPr>
+          <p:cNvPr id="4" name="Slide Number Placeholder 3"/>
+          <p:cNvSpPr>
+            <a:spLocks noGrp="1"/>
+          </p:cNvSpPr>
+          <p:nvPr>
+            <p:ph type="sldNum" sz="quarter" idx="10"/>
+          </p:nvPr>
+        </p:nvSpPr>
+        <p:spPr/>
+        <p:txBody>
+          <a:bodyPr/>
+          <a:lstStyle/>
+          <a:p>
+            <a:fld id="{1A0CEA6E-5219-9F41-9139-55A386DACCBC}" type="slidenum">
+              <a:rPr lang="en-US" smtClean="0"/>
+              <a:t>10</a:t>
+            </a:fld>
+            <a:endParaRPr lang="en-US"/>
+          </a:p>
+        </p:txBody>
+      </p:sp>
+    </p:spTree>
+    <p:extLst>
+      <p:ext uri="{BB962C8B-B14F-4D97-AF65-F5344CB8AC3E}">
+        <p14:creationId xmlns:p14="http://schemas.microsoft.com/office/powerpoint/2010/main" val="2550462569"/>
+      </p:ext>
+    </p:extLst>
+  </p:cSld>
+  <p:clrMapOvr>
+    <a:masterClrMapping/>
+  </p:clrMapOvr>
+</p:notes>
+</file>
+
 <file path=ppt/slideLayouts/slideLayout1.xml><?xml version="1.0" encoding="utf-8"?>
 <p:sldLayout xmlns:a="http://schemas.openxmlformats.org/drawingml/2006/main" xmlns:r="http://schemas.openxmlformats.org/officeDocument/2006/relationships" xmlns:p="http://schemas.openxmlformats.org/presentationml/2006/main" type="title" preserve="1">
   <p:cSld name="Title Slide">
@@ -656,7 +759,7 @@
             <a:fld id="{8ACDB3CC-F982-40F9-8DD6-BCC9AFBF44BD}" type="datetime1">
               <a:rPr lang="en-US" smtClean="0"/>
               <a:pPr/>
-              <a:t>11/1/11</a:t>
+              <a:t>11/3/11</a:t>
             </a:fld>
             <a:endParaRPr lang="en-US" dirty="0"/>
           </a:p>
@@ -827,7 +930,7 @@
           <a:p>
             <a:fld id="{F7BCA931-0682-6041-AF1E-59CB6C73D43C}" type="datetimeFigureOut">
               <a:rPr lang="en-US" smtClean="0"/>
-              <a:t>11/1/11</a:t>
+              <a:t>11/3/11</a:t>
             </a:fld>
             <a:endParaRPr lang="en-US"/>
           </a:p>
@@ -1007,7 +1110,7 @@
           <a:p>
             <a:fld id="{F7BCA931-0682-6041-AF1E-59CB6C73D43C}" type="datetimeFigureOut">
               <a:rPr lang="en-US" smtClean="0"/>
-              <a:t>11/1/11</a:t>
+              <a:t>11/3/11</a:t>
             </a:fld>
             <a:endParaRPr lang="en-US"/>
           </a:p>
@@ -1177,7 +1280,7 @@
           <a:p>
             <a:fld id="{F7BCA931-0682-6041-AF1E-59CB6C73D43C}" type="datetimeFigureOut">
               <a:rPr lang="en-US" smtClean="0"/>
-              <a:t>11/1/11</a:t>
+              <a:t>11/3/11</a:t>
             </a:fld>
             <a:endParaRPr lang="en-US"/>
           </a:p>
@@ -1424,7 +1527,7 @@
             <a:fld id="{64DDAE5B-B07C-441A-8026-C23A427A74DC}" type="datetime1">
               <a:rPr lang="en-US" smtClean="0"/>
               <a:pPr/>
-              <a:t>11/1/11</a:t>
+              <a:t>11/3/11</a:t>
             </a:fld>
             <a:endParaRPr lang="en-US"/>
           </a:p>
@@ -1713,7 +1816,7 @@
           <a:p>
             <a:fld id="{F7BCA931-0682-6041-AF1E-59CB6C73D43C}" type="datetimeFigureOut">
               <a:rPr lang="en-US" smtClean="0"/>
-              <a:t>11/1/11</a:t>
+              <a:t>11/3/11</a:t>
             </a:fld>
             <a:endParaRPr lang="en-US"/>
           </a:p>
@@ -2135,7 +2238,7 @@
           <a:p>
             <a:fld id="{F7BCA931-0682-6041-AF1E-59CB6C73D43C}" type="datetimeFigureOut">
               <a:rPr lang="en-US" smtClean="0"/>
-              <a:t>11/1/11</a:t>
+              <a:t>11/3/11</a:t>
             </a:fld>
             <a:endParaRPr lang="en-US"/>
           </a:p>
@@ -2253,7 +2356,7 @@
           <a:p>
             <a:fld id="{F7BCA931-0682-6041-AF1E-59CB6C73D43C}" type="datetimeFigureOut">
               <a:rPr lang="en-US" smtClean="0"/>
-              <a:t>11/1/11</a:t>
+              <a:t>11/3/11</a:t>
             </a:fld>
             <a:endParaRPr lang="en-US"/>
           </a:p>
@@ -2348,7 +2451,7 @@
           <a:p>
             <a:fld id="{F7BCA931-0682-6041-AF1E-59CB6C73D43C}" type="datetimeFigureOut">
               <a:rPr lang="en-US" smtClean="0"/>
-              <a:t>11/1/11</a:t>
+              <a:t>11/3/11</a:t>
             </a:fld>
             <a:endParaRPr lang="en-US"/>
           </a:p>
@@ -2625,7 +2728,7 @@
           <a:p>
             <a:fld id="{F7BCA931-0682-6041-AF1E-59CB6C73D43C}" type="datetimeFigureOut">
               <a:rPr lang="en-US" smtClean="0"/>
-              <a:t>11/1/11</a:t>
+              <a:t>11/3/11</a:t>
             </a:fld>
             <a:endParaRPr lang="en-US"/>
           </a:p>
@@ -2879,7 +2982,7 @@
           <a:p>
             <a:fld id="{F7BCA931-0682-6041-AF1E-59CB6C73D43C}" type="datetimeFigureOut">
               <a:rPr lang="en-US" smtClean="0"/>
-              <a:t>11/1/11</a:t>
+              <a:t>11/3/11</a:t>
             </a:fld>
             <a:endParaRPr lang="en-US"/>
           </a:p>
@@ -3092,7 +3195,7 @@
           <a:p>
             <a:fld id="{F7BCA931-0682-6041-AF1E-59CB6C73D43C}" type="datetimeFigureOut">
               <a:rPr lang="en-US" smtClean="0"/>
-              <a:t>11/1/11</a:t>
+              <a:t>11/3/11</a:t>
             </a:fld>
             <a:endParaRPr lang="en-US"/>
           </a:p>
@@ -3570,6 +3673,290 @@
           <a:p>
             <a:pPr algn="ctr"/>
             <a:r>
+              <a:rPr lang="en-US" sz="5400" dirty="0" err="1" smtClean="0">
+                <a:ln w="18415" cmpd="sng">
+                  <a:solidFill>
+                    <a:srgbClr val="FFFFFF"/>
+                  </a:solidFill>
+                  <a:prstDash val="solid"/>
+                </a:ln>
+                <a:solidFill>
+                  <a:srgbClr val="FFFFFF"/>
+                </a:solidFill>
+                <a:effectLst>
+                  <a:outerShdw blurRad="63500" dir="3600000" algn="tl" rotWithShape="0">
+                    <a:srgbClr val="000000">
+                      <a:alpha val="70000"/>
+                    </a:srgbClr>
+                  </a:outerShdw>
+                </a:effectLst>
+              </a:rPr>
+              <a:t>Pushstate</a:t>
+            </a:r>
+            <a:r>
+              <a:rPr lang="en-US" sz="5400" dirty="0" smtClean="0">
+                <a:ln w="18415" cmpd="sng">
+                  <a:solidFill>
+                    <a:srgbClr val="FFFFFF"/>
+                  </a:solidFill>
+                  <a:prstDash val="solid"/>
+                </a:ln>
+                <a:solidFill>
+                  <a:srgbClr val="FFFFFF"/>
+                </a:solidFill>
+                <a:effectLst>
+                  <a:outerShdw blurRad="63500" dir="3600000" algn="tl" rotWithShape="0">
+                    <a:srgbClr val="000000">
+                      <a:alpha val="70000"/>
+                    </a:srgbClr>
+                  </a:outerShdw>
+                </a:effectLst>
+              </a:rPr>
+              <a:t> / History API</a:t>
+            </a:r>
+            <a:endParaRPr lang="en-US" sz="5400" dirty="0" smtClean="0">
+              <a:ln w="18415" cmpd="sng">
+                <a:solidFill>
+                  <a:srgbClr val="FFFFFF"/>
+                </a:solidFill>
+                <a:prstDash val="solid"/>
+              </a:ln>
+              <a:solidFill>
+                <a:srgbClr val="FFFFFF"/>
+              </a:solidFill>
+              <a:effectLst>
+                <a:outerShdw blurRad="63500" dir="3600000" algn="tl" rotWithShape="0">
+                  <a:srgbClr val="000000">
+                    <a:alpha val="70000"/>
+                  </a:srgbClr>
+                </a:outerShdw>
+              </a:effectLst>
+            </a:endParaRPr>
+          </a:p>
+        </p:txBody>
+      </p:sp>
+      <p:grpSp>
+        <p:nvGrpSpPr>
+          <p:cNvPr id="5" name="Group 4"/>
+          <p:cNvGrpSpPr/>
+          <p:nvPr/>
+        </p:nvGrpSpPr>
+        <p:grpSpPr>
+          <a:xfrm>
+            <a:off x="273050" y="1923981"/>
+            <a:ext cx="8597900" cy="2407699"/>
+            <a:chOff x="273050" y="1903807"/>
+            <a:chExt cx="8597900" cy="2407699"/>
+          </a:xfrm>
+        </p:grpSpPr>
+        <p:pic>
+          <p:nvPicPr>
+            <p:cNvPr id="2" name="Picture 1" descr="Screen Shot 2011-11-01 at 8.53.30 PM.png"/>
+            <p:cNvPicPr>
+              <a:picLocks noChangeAspect="1"/>
+            </p:cNvPicPr>
+            <p:nvPr/>
+          </p:nvPicPr>
+          <p:blipFill>
+            <a:blip r:embed="rId3">
+              <a:extLst>
+                <a:ext uri="{28A0092B-C50C-407E-A947-70E740481C1C}">
+                  <a14:useLocalDpi xmlns:a14="http://schemas.microsoft.com/office/drawing/2010/main" val="0"/>
+                </a:ext>
+              </a:extLst>
+            </a:blip>
+            <a:stretch>
+              <a:fillRect/>
+            </a:stretch>
+          </p:blipFill>
+          <p:spPr>
+            <a:xfrm>
+              <a:off x="273050" y="1903807"/>
+              <a:ext cx="8597900" cy="2197100"/>
+            </a:xfrm>
+            <a:prstGeom prst="rect">
+              <a:avLst/>
+            </a:prstGeom>
+          </p:spPr>
+        </p:pic>
+        <p:sp>
+          <p:nvSpPr>
+            <p:cNvPr id="3" name="TextBox 2"/>
+            <p:cNvSpPr txBox="1"/>
+            <p:nvPr/>
+          </p:nvSpPr>
+          <p:spPr>
+            <a:xfrm>
+              <a:off x="2612664" y="3942174"/>
+              <a:ext cx="3918673" cy="369332"/>
+            </a:xfrm>
+            <a:prstGeom prst="rect">
+              <a:avLst/>
+            </a:prstGeom>
+            <a:noFill/>
+          </p:spPr>
+          <p:txBody>
+            <a:bodyPr wrap="none" rtlCol="0">
+              <a:spAutoFit/>
+            </a:bodyPr>
+            <a:lstStyle/>
+            <a:p>
+              <a:r>
+                <a:rPr lang="en-US" b="1" dirty="0" smtClean="0">
+                  <a:hlinkClick r:id="rId4"/>
+                </a:rPr>
+                <a:t>http://diveintohtml5.info/history.html</a:t>
+              </a:r>
+              <a:endParaRPr lang="en-US" b="1" dirty="0" smtClean="0"/>
+            </a:p>
+          </p:txBody>
+        </p:sp>
+      </p:grpSp>
+      <p:sp>
+        <p:nvSpPr>
+          <p:cNvPr id="4" name="TextBox 3"/>
+          <p:cNvSpPr txBox="1"/>
+          <p:nvPr/>
+        </p:nvSpPr>
+        <p:spPr>
+          <a:xfrm>
+            <a:off x="901364" y="5847101"/>
+            <a:ext cx="7341273" cy="584776"/>
+          </a:xfrm>
+          <a:prstGeom prst="rect">
+            <a:avLst/>
+          </a:prstGeom>
+          <a:noFill/>
+        </p:spPr>
+        <p:txBody>
+          <a:bodyPr wrap="none" rtlCol="0">
+            <a:spAutoFit/>
+          </a:bodyPr>
+          <a:lstStyle/>
+          <a:p>
+            <a:r>
+              <a:rPr lang="en-US" sz="3200" b="1" dirty="0" err="1" smtClean="0"/>
+              <a:t>Backbone.history.start</a:t>
+            </a:r>
+            <a:r>
+              <a:rPr lang="en-US" sz="3200" b="1" dirty="0" smtClean="0"/>
+              <a:t>({</a:t>
+            </a:r>
+            <a:r>
+              <a:rPr lang="en-US" sz="3200" b="1" dirty="0" err="1" smtClean="0"/>
+              <a:t>pushState</a:t>
+            </a:r>
+            <a:r>
+              <a:rPr lang="en-US" sz="3200" b="1" dirty="0" smtClean="0"/>
+              <a:t>: true});</a:t>
+            </a:r>
+            <a:endParaRPr lang="en-US" sz="3200" b="1" dirty="0"/>
+          </a:p>
+        </p:txBody>
+      </p:sp>
+      <p:pic>
+        <p:nvPicPr>
+          <p:cNvPr id="6" name="Picture 5" descr="Screen Shot 2011-11-01 at 8.56.38 PM.png"/>
+          <p:cNvPicPr>
+            <a:picLocks noChangeAspect="1"/>
+          </p:cNvPicPr>
+          <p:nvPr/>
+        </p:nvPicPr>
+        <p:blipFill>
+          <a:blip r:embed="rId5">
+            <a:extLst>
+              <a:ext uri="{28A0092B-C50C-407E-A947-70E740481C1C}">
+                <a14:useLocalDpi xmlns:a14="http://schemas.microsoft.com/office/drawing/2010/main" val="0"/>
+              </a:ext>
+            </a:extLst>
+          </a:blip>
+          <a:stretch>
+            <a:fillRect/>
+          </a:stretch>
+        </p:blipFill>
+        <p:spPr>
+          <a:xfrm>
+            <a:off x="2022487" y="4831284"/>
+            <a:ext cx="5099026" cy="710520"/>
+          </a:xfrm>
+          <a:prstGeom prst="rect">
+            <a:avLst/>
+          </a:prstGeom>
+        </p:spPr>
+      </p:pic>
+    </p:spTree>
+    <p:extLst>
+      <p:ext uri="{BB962C8B-B14F-4D97-AF65-F5344CB8AC3E}">
+        <p14:creationId xmlns:p14="http://schemas.microsoft.com/office/powerpoint/2010/main" val="2398771249"/>
+      </p:ext>
+    </p:extLst>
+  </p:cSld>
+  <p:clrMapOvr>
+    <a:masterClrMapping/>
+  </p:clrMapOvr>
+  <mc:AlternateContent xmlns:mc="http://schemas.openxmlformats.org/markup-compatibility/2006" xmlns:p14="http://schemas.microsoft.com/office/powerpoint/2010/main">
+    <mc:Choice Requires="p14">
+      <p:transition spd="slow" p14:dur="2000"/>
+    </mc:Choice>
+    <mc:Fallback xmlns="">
+      <p:transition xmlns:p14="http://schemas.microsoft.com/office/powerpoint/2010/main" spd="slow"/>
+    </mc:Fallback>
+  </mc:AlternateContent>
+</p:sld>
+</file>
+
+<file path=ppt/slides/slide11.xml><?xml version="1.0" encoding="utf-8"?>
+<p:sld xmlns:a="http://schemas.openxmlformats.org/drawingml/2006/main" xmlns:r="http://schemas.openxmlformats.org/officeDocument/2006/relationships" xmlns:p="http://schemas.openxmlformats.org/presentationml/2006/main">
+  <p:cSld>
+    <p:spTree>
+      <p:nvGrpSpPr>
+        <p:cNvPr id="1" name=""/>
+        <p:cNvGrpSpPr/>
+        <p:nvPr/>
+      </p:nvGrpSpPr>
+      <p:grpSpPr>
+        <a:xfrm>
+          <a:off x="0" y="0"/>
+          <a:ext cx="0" cy="0"/>
+          <a:chOff x="0" y="0"/>
+          <a:chExt cx="0" cy="0"/>
+        </a:xfrm>
+      </p:grpSpPr>
+      <p:sp>
+        <p:nvSpPr>
+          <p:cNvPr id="7" name="Rectangle 6"/>
+          <p:cNvSpPr/>
+          <p:nvPr/>
+        </p:nvSpPr>
+        <p:spPr>
+          <a:xfrm>
+            <a:off x="0" y="0"/>
+            <a:ext cx="9144000" cy="1684460"/>
+          </a:xfrm>
+          <a:prstGeom prst="rect">
+            <a:avLst/>
+          </a:prstGeom>
+        </p:spPr>
+        <p:style>
+          <a:lnRef idx="1">
+            <a:schemeClr val="dk1"/>
+          </a:lnRef>
+          <a:fillRef idx="3">
+            <a:schemeClr val="dk1"/>
+          </a:fillRef>
+          <a:effectRef idx="2">
+            <a:schemeClr val="dk1"/>
+          </a:effectRef>
+          <a:fontRef idx="minor">
+            <a:schemeClr val="lt1"/>
+          </a:fontRef>
+        </p:style>
+        <p:txBody>
+          <a:bodyPr rtlCol="0" anchor="ctr"/>
+          <a:lstStyle/>
+          <a:p>
+            <a:pPr algn="ctr"/>
+            <a:r>
               <a:rPr lang="en-US" sz="5400" dirty="0" smtClean="0">
                 <a:ln w="18415" cmpd="sng">
                   <a:solidFill>
@@ -3700,7 +4087,7 @@
 </p:sld>
 </file>
 
-<file path=ppt/slides/slide11.xml><?xml version="1.0" encoding="utf-8"?>
+<file path=ppt/slides/slide12.xml><?xml version="1.0" encoding="utf-8"?>
 <p:sld xmlns:a="http://schemas.openxmlformats.org/drawingml/2006/main" xmlns:r="http://schemas.openxmlformats.org/officeDocument/2006/relationships" xmlns:p="http://schemas.openxmlformats.org/presentationml/2006/main">
   <p:cSld>
     <p:spTree>
@@ -3844,7 +4231,7 @@
 </p:sld>
 </file>
 
-<file path=ppt/slides/slide12.xml><?xml version="1.0" encoding="utf-8"?>
+<file path=ppt/slides/slide13.xml><?xml version="1.0" encoding="utf-8"?>
 <p:sld xmlns:a="http://schemas.openxmlformats.org/drawingml/2006/main" xmlns:r="http://schemas.openxmlformats.org/officeDocument/2006/relationships" xmlns:p="http://schemas.openxmlformats.org/presentationml/2006/main">
   <p:cSld>
     <p:spTree>
@@ -4039,7 +4426,7 @@
 </p:sld>
 </file>
 
-<file path=ppt/slides/slide13.xml><?xml version="1.0" encoding="utf-8"?>
+<file path=ppt/slides/slide14.xml><?xml version="1.0" encoding="utf-8"?>
 <p:sld xmlns:a="http://schemas.openxmlformats.org/drawingml/2006/main" xmlns:r="http://schemas.openxmlformats.org/officeDocument/2006/relationships" xmlns:p="http://schemas.openxmlformats.org/presentationml/2006/main">
   <p:cSld>
     <p:spTree>
@@ -4216,7 +4603,7 @@
 </p:sld>
 </file>
 
-<file path=ppt/slides/slide14.xml><?xml version="1.0" encoding="utf-8"?>
+<file path=ppt/slides/slide15.xml><?xml version="1.0" encoding="utf-8"?>
 <p:sld xmlns:a="http://schemas.openxmlformats.org/drawingml/2006/main" xmlns:r="http://schemas.openxmlformats.org/officeDocument/2006/relationships" xmlns:p="http://schemas.openxmlformats.org/presentationml/2006/main">
   <p:cSld>
     <p:spTree>
@@ -4406,7 +4793,7 @@
 </p:sld>
 </file>
 
-<file path=ppt/slides/slide15.xml><?xml version="1.0" encoding="utf-8"?>
+<file path=ppt/slides/slide16.xml><?xml version="1.0" encoding="utf-8"?>
 <p:sld xmlns:a="http://schemas.openxmlformats.org/drawingml/2006/main" xmlns:r="http://schemas.openxmlformats.org/officeDocument/2006/relationships" xmlns:p="http://schemas.openxmlformats.org/presentationml/2006/main">
   <p:cSld>
     <p:spTree>
@@ -4554,11 +4941,7 @@
             </a:r>
             <a:r>
               <a:rPr lang="en-US" sz="2800" b="1" dirty="0" smtClean="0"/>
-              <a:t>/</a:t>
-            </a:r>
-            <a:r>
-              <a:rPr lang="en-US" sz="2800" b="1" dirty="0" smtClean="0"/>
-              <a:t>resources      </a:t>
+              <a:t>/resources      </a:t>
             </a:r>
             <a:r>
               <a:rPr lang="en-US" sz="2400" dirty="0" smtClean="0">
@@ -4581,19 +4964,7 @@
                 </a:solidFill>
                 <a:sym typeface="Wingdings"/>
               </a:rPr>
-              <a:t>&lt;----</a:t>
-            </a:r>
-            <a:r>
-              <a:rPr lang="en-US" sz="2400" dirty="0" smtClean="0">
-                <a:solidFill>
-                  <a:schemeClr val="tx1">
-                    <a:lumMod val="50000"/>
-                    <a:lumOff val="50000"/>
-                  </a:schemeClr>
-                </a:solidFill>
-                <a:sym typeface="Wingdings"/>
-              </a:rPr>
-              <a:t> my site   )</a:t>
+              <a:t>&lt;---- my site   )</a:t>
             </a:r>
             <a:endParaRPr lang="en-US" sz="2400" dirty="0" smtClean="0">
               <a:solidFill>
@@ -7489,19 +7860,20 @@
       </p:grpSp>
       <p:cxnSp>
         <p:nvCxnSpPr>
-          <p:cNvPr id="18" name="Curved Connector 17"/>
+          <p:cNvPr id="9" name="Straight Arrow Connector 8"/>
           <p:cNvCxnSpPr/>
           <p:nvPr/>
         </p:nvCxnSpPr>
         <p:spPr>
-          <a:xfrm flipV="1">
-            <a:off x="7818806" y="4108693"/>
-            <a:ext cx="0" cy="946842"/>
+          <a:xfrm>
+            <a:off x="3685149" y="3526629"/>
+            <a:ext cx="1943334" cy="1634735"/>
           </a:xfrm>
           <a:prstGeom prst="straightConnector1">
             <a:avLst/>
           </a:prstGeom>
           <a:ln>
+            <a:headEnd type="arrow"/>
             <a:tailEnd type="arrow"/>
           </a:ln>
         </p:spPr>
@@ -7522,19 +7894,20 @@
       </p:cxnSp>
       <p:cxnSp>
         <p:nvCxnSpPr>
-          <p:cNvPr id="28" name="Curved Connector 27"/>
+          <p:cNvPr id="16" name="Straight Arrow Connector 15"/>
           <p:cNvCxnSpPr/>
           <p:nvPr/>
         </p:nvCxnSpPr>
         <p:spPr>
           <a:xfrm>
-            <a:off x="3613849" y="3573539"/>
-            <a:ext cx="1815082" cy="1587825"/>
+            <a:off x="7808597" y="3897033"/>
+            <a:ext cx="1" cy="1264331"/>
           </a:xfrm>
           <a:prstGeom prst="straightConnector1">
             <a:avLst/>
           </a:prstGeom>
           <a:ln>
+            <a:headEnd type="arrow"/>
             <a:tailEnd type="arrow"/>
           </a:ln>
         </p:spPr>
@@ -7829,8 +8202,479 @@
                   </a:outerShdw>
                 </a:effectLst>
               </a:rPr>
-              <a:t>Routing</a:t>
-            </a:r>
+              <a:t>Routing &amp; History</a:t>
+            </a:r>
+            <a:endParaRPr lang="en-US" sz="5400" dirty="0" smtClean="0">
+              <a:ln w="18415" cmpd="sng">
+                <a:solidFill>
+                  <a:srgbClr val="FFFFFF"/>
+                </a:solidFill>
+                <a:prstDash val="solid"/>
+              </a:ln>
+              <a:solidFill>
+                <a:srgbClr val="FFFFFF"/>
+              </a:solidFill>
+              <a:effectLst>
+                <a:outerShdw blurRad="63500" dir="3600000" algn="tl" rotWithShape="0">
+                  <a:srgbClr val="000000">
+                    <a:alpha val="70000"/>
+                  </a:srgbClr>
+                </a:outerShdw>
+              </a:effectLst>
+            </a:endParaRPr>
+          </a:p>
+        </p:txBody>
+      </p:sp>
+      <p:grpSp>
+        <p:nvGrpSpPr>
+          <p:cNvPr id="8" name="Group 7"/>
+          <p:cNvGrpSpPr/>
+          <p:nvPr/>
+        </p:nvGrpSpPr>
+        <p:grpSpPr>
+          <a:xfrm>
+            <a:off x="360579" y="2336699"/>
+            <a:ext cx="4178300" cy="1783795"/>
+            <a:chOff x="2482850" y="1870760"/>
+            <a:chExt cx="4178300" cy="1783795"/>
+          </a:xfrm>
+        </p:grpSpPr>
+        <p:sp>
+          <p:nvSpPr>
+            <p:cNvPr id="4" name="Rectangle 3"/>
+            <p:cNvSpPr/>
+            <p:nvPr/>
+          </p:nvSpPr>
+          <p:spPr>
+            <a:xfrm>
+              <a:off x="2482850" y="1870760"/>
+              <a:ext cx="4178300" cy="1783795"/>
+            </a:xfrm>
+            <a:prstGeom prst="rect">
+              <a:avLst/>
+            </a:prstGeom>
+            <a:ln w="6350" cmpd="sng"/>
+          </p:spPr>
+          <p:style>
+            <a:lnRef idx="2">
+              <a:schemeClr val="dk1"/>
+            </a:lnRef>
+            <a:fillRef idx="1">
+              <a:schemeClr val="lt1"/>
+            </a:fillRef>
+            <a:effectRef idx="0">
+              <a:schemeClr val="dk1"/>
+            </a:effectRef>
+            <a:fontRef idx="minor">
+              <a:schemeClr val="dk1"/>
+            </a:fontRef>
+          </p:style>
+          <p:txBody>
+            <a:bodyPr rtlCol="0" anchor="ctr"/>
+            <a:lstStyle/>
+            <a:p>
+              <a:pPr algn="ctr"/>
+              <a:r>
+                <a:rPr lang="en-US" dirty="0" smtClean="0">
+                  <a:solidFill>
+                    <a:schemeClr val="tx1">
+                      <a:lumMod val="50000"/>
+                      <a:lumOff val="50000"/>
+                    </a:schemeClr>
+                  </a:solidFill>
+                </a:rPr>
+                <a:t>My Inbox</a:t>
+              </a:r>
+              <a:endParaRPr lang="en-US" dirty="0">
+                <a:solidFill>
+                  <a:schemeClr val="tx1">
+                    <a:lumMod val="50000"/>
+                    <a:lumOff val="50000"/>
+                  </a:schemeClr>
+                </a:solidFill>
+              </a:endParaRPr>
+            </a:p>
+          </p:txBody>
+        </p:sp>
+        <p:pic>
+          <p:nvPicPr>
+            <p:cNvPr id="2" name="Picture 1" descr="Screen Shot 2011-11-03 at 9.38.23 AM.png"/>
+            <p:cNvPicPr>
+              <a:picLocks noChangeAspect="1"/>
+            </p:cNvPicPr>
+            <p:nvPr/>
+          </p:nvPicPr>
+          <p:blipFill>
+            <a:blip r:embed="rId2">
+              <a:extLst>
+                <a:ext uri="{28A0092B-C50C-407E-A947-70E740481C1C}">
+                  <a14:useLocalDpi xmlns:a14="http://schemas.microsoft.com/office/drawing/2010/main" val="0"/>
+                </a:ext>
+              </a:extLst>
+            </a:blip>
+            <a:stretch>
+              <a:fillRect/>
+            </a:stretch>
+          </p:blipFill>
+          <p:spPr>
+            <a:xfrm>
+              <a:off x="2482850" y="1870760"/>
+              <a:ext cx="4178300" cy="406400"/>
+            </a:xfrm>
+            <a:prstGeom prst="rect">
+              <a:avLst/>
+            </a:prstGeom>
+          </p:spPr>
+        </p:pic>
+      </p:grpSp>
+      <p:grpSp>
+        <p:nvGrpSpPr>
+          <p:cNvPr id="5" name="Group 4"/>
+          <p:cNvGrpSpPr/>
+          <p:nvPr/>
+        </p:nvGrpSpPr>
+        <p:grpSpPr>
+          <a:xfrm>
+            <a:off x="360579" y="4849210"/>
+            <a:ext cx="5969000" cy="1783795"/>
+            <a:chOff x="1580727" y="4575130"/>
+            <a:chExt cx="5969000" cy="1783795"/>
+          </a:xfrm>
+        </p:grpSpPr>
+        <p:sp>
+          <p:nvSpPr>
+            <p:cNvPr id="11" name="Rectangle 10"/>
+            <p:cNvSpPr/>
+            <p:nvPr/>
+          </p:nvSpPr>
+          <p:spPr>
+            <a:xfrm>
+              <a:off x="1580727" y="4575130"/>
+              <a:ext cx="5969000" cy="1783795"/>
+            </a:xfrm>
+            <a:prstGeom prst="rect">
+              <a:avLst/>
+            </a:prstGeom>
+            <a:ln w="6350" cmpd="sng"/>
+          </p:spPr>
+          <p:style>
+            <a:lnRef idx="2">
+              <a:schemeClr val="dk1"/>
+            </a:lnRef>
+            <a:fillRef idx="1">
+              <a:schemeClr val="lt1"/>
+            </a:fillRef>
+            <a:effectRef idx="0">
+              <a:schemeClr val="dk1"/>
+            </a:effectRef>
+            <a:fontRef idx="minor">
+              <a:schemeClr val="dk1"/>
+            </a:fontRef>
+          </p:style>
+          <p:txBody>
+            <a:bodyPr rtlCol="0" anchor="ctr"/>
+            <a:lstStyle/>
+            <a:p>
+              <a:pPr algn="ctr"/>
+              <a:r>
+                <a:rPr lang="en-US" dirty="0" smtClean="0">
+                  <a:solidFill>
+                    <a:schemeClr val="tx1">
+                      <a:lumMod val="50000"/>
+                      <a:lumOff val="50000"/>
+                    </a:schemeClr>
+                  </a:solidFill>
+                </a:rPr>
+                <a:t>Content For Email 13339d0a…</a:t>
+              </a:r>
+              <a:endParaRPr lang="en-US" dirty="0">
+                <a:solidFill>
+                  <a:schemeClr val="tx1">
+                    <a:lumMod val="50000"/>
+                    <a:lumOff val="50000"/>
+                  </a:schemeClr>
+                </a:solidFill>
+              </a:endParaRPr>
+            </a:p>
+          </p:txBody>
+        </p:sp>
+        <p:pic>
+          <p:nvPicPr>
+            <p:cNvPr id="3" name="Picture 2" descr="Screen Shot 2011-11-03 at 9.39.18 AM.png"/>
+            <p:cNvPicPr>
+              <a:picLocks noChangeAspect="1"/>
+            </p:cNvPicPr>
+            <p:nvPr/>
+          </p:nvPicPr>
+          <p:blipFill>
+            <a:blip r:embed="rId3">
+              <a:extLst>
+                <a:ext uri="{28A0092B-C50C-407E-A947-70E740481C1C}">
+                  <a14:useLocalDpi xmlns:a14="http://schemas.microsoft.com/office/drawing/2010/main" val="0"/>
+                </a:ext>
+              </a:extLst>
+            </a:blip>
+            <a:stretch>
+              <a:fillRect/>
+            </a:stretch>
+          </p:blipFill>
+          <p:spPr>
+            <a:xfrm>
+              <a:off x="1580727" y="4575130"/>
+              <a:ext cx="5969000" cy="406400"/>
+            </a:xfrm>
+            <a:prstGeom prst="rect">
+              <a:avLst/>
+            </a:prstGeom>
+          </p:spPr>
+        </p:pic>
+      </p:grpSp>
+      <p:sp>
+        <p:nvSpPr>
+          <p:cNvPr id="10" name="TextBox 9"/>
+          <p:cNvSpPr txBox="1"/>
+          <p:nvPr/>
+        </p:nvSpPr>
+        <p:spPr>
+          <a:xfrm>
+            <a:off x="5071116" y="1845550"/>
+            <a:ext cx="3814303" cy="2862323"/>
+          </a:xfrm>
+          <a:prstGeom prst="rect">
+            <a:avLst/>
+          </a:prstGeom>
+          <a:noFill/>
+        </p:spPr>
+        <p:txBody>
+          <a:bodyPr wrap="none" rtlCol="0">
+            <a:spAutoFit/>
+          </a:bodyPr>
+          <a:lstStyle/>
+          <a:p>
+            <a:r>
+              <a:rPr lang="en-US" dirty="0" err="1" smtClean="0"/>
+              <a:t>MyRouter</a:t>
+            </a:r>
+            <a:r>
+              <a:rPr lang="en-US" dirty="0" smtClean="0"/>
+              <a:t> = </a:t>
+            </a:r>
+            <a:r>
+              <a:rPr lang="en-US" dirty="0" err="1" smtClean="0"/>
+              <a:t>Backbone.Router.extend</a:t>
+            </a:r>
+            <a:r>
+              <a:rPr lang="en-US" dirty="0" smtClean="0"/>
+              <a:t>({</a:t>
+            </a:r>
+          </a:p>
+          <a:p>
+            <a:r>
+              <a:rPr lang="en-US" dirty="0" smtClean="0"/>
+              <a:t>  routes: { </a:t>
+            </a:r>
+          </a:p>
+          <a:p>
+            <a:r>
+              <a:rPr lang="en-US" dirty="0"/>
+              <a:t> </a:t>
+            </a:r>
+            <a:r>
+              <a:rPr lang="en-US" dirty="0" smtClean="0"/>
+              <a:t>   “inbox”: “</a:t>
+            </a:r>
+            <a:r>
+              <a:rPr lang="en-US" dirty="0" err="1" smtClean="0"/>
+              <a:t>showInbox</a:t>
+            </a:r>
+            <a:r>
+              <a:rPr lang="en-US" dirty="0" smtClean="0"/>
+              <a:t>”,</a:t>
+            </a:r>
+          </a:p>
+          <a:p>
+            <a:r>
+              <a:rPr lang="en-US" dirty="0"/>
+              <a:t> </a:t>
+            </a:r>
+            <a:r>
+              <a:rPr lang="en-US" dirty="0" smtClean="0"/>
+              <a:t>   “inbox/:id”: </a:t>
+            </a:r>
+            <a:r>
+              <a:rPr lang="en-US" dirty="0" err="1" smtClean="0"/>
+              <a:t>showEmail</a:t>
+            </a:r>
+            <a:r>
+              <a:rPr lang="en-US" dirty="0" smtClean="0"/>
+              <a:t>”</a:t>
+            </a:r>
+          </a:p>
+          <a:p>
+            <a:r>
+              <a:rPr lang="en-US" dirty="0"/>
+              <a:t> </a:t>
+            </a:r>
+            <a:r>
+              <a:rPr lang="en-US" dirty="0" smtClean="0"/>
+              <a:t> },</a:t>
+            </a:r>
+          </a:p>
+          <a:p>
+            <a:endParaRPr lang="en-US" dirty="0"/>
+          </a:p>
+          <a:p>
+            <a:r>
+              <a:rPr lang="en-US" dirty="0" smtClean="0"/>
+              <a:t>  </a:t>
+            </a:r>
+            <a:r>
+              <a:rPr lang="en-US" dirty="0" err="1" smtClean="0"/>
+              <a:t>showInbox</a:t>
+            </a:r>
+            <a:r>
+              <a:rPr lang="en-US" dirty="0" smtClean="0"/>
+              <a:t>: function() { … },</a:t>
+            </a:r>
+          </a:p>
+          <a:p>
+            <a:endParaRPr lang="en-US" dirty="0"/>
+          </a:p>
+          <a:p>
+            <a:r>
+              <a:rPr lang="en-US" dirty="0" smtClean="0"/>
+              <a:t>  </a:t>
+            </a:r>
+            <a:r>
+              <a:rPr lang="en-US" dirty="0" err="1" smtClean="0"/>
+              <a:t>showEmail</a:t>
+            </a:r>
+            <a:r>
+              <a:rPr lang="en-US" dirty="0" smtClean="0"/>
+              <a:t>: function(id) { … }</a:t>
+            </a:r>
+            <a:endParaRPr lang="en-US" dirty="0"/>
+          </a:p>
+          <a:p>
+            <a:r>
+              <a:rPr lang="en-US" dirty="0" smtClean="0"/>
+              <a:t>})</a:t>
+            </a:r>
+            <a:endParaRPr lang="en-US" dirty="0"/>
+          </a:p>
+        </p:txBody>
+      </p:sp>
+    </p:spTree>
+    <p:extLst>
+      <p:ext uri="{BB962C8B-B14F-4D97-AF65-F5344CB8AC3E}">
+        <p14:creationId xmlns:p14="http://schemas.microsoft.com/office/powerpoint/2010/main" val="1175623307"/>
+      </p:ext>
+    </p:extLst>
+  </p:cSld>
+  <p:clrMapOvr>
+    <a:masterClrMapping/>
+  </p:clrMapOvr>
+  <mc:AlternateContent xmlns:mc="http://schemas.openxmlformats.org/markup-compatibility/2006" xmlns:p14="http://schemas.microsoft.com/office/powerpoint/2010/main">
+    <mc:Choice Requires="p14">
+      <p:transition spd="slow" p14:dur="2000"/>
+    </mc:Choice>
+    <mc:Fallback xmlns="">
+      <p:transition xmlns:p14="http://schemas.microsoft.com/office/powerpoint/2010/main" spd="slow"/>
+    </mc:Fallback>
+  </mc:AlternateContent>
+</p:sld>
+</file>
+
+<file path=ppt/slides/slide9.xml><?xml version="1.0" encoding="utf-8"?>
+<p:sld xmlns:a="http://schemas.openxmlformats.org/drawingml/2006/main" xmlns:r="http://schemas.openxmlformats.org/officeDocument/2006/relationships" xmlns:p="http://schemas.openxmlformats.org/presentationml/2006/main">
+  <p:cSld>
+    <p:spTree>
+      <p:nvGrpSpPr>
+        <p:cNvPr id="1" name=""/>
+        <p:cNvGrpSpPr/>
+        <p:nvPr/>
+      </p:nvGrpSpPr>
+      <p:grpSpPr>
+        <a:xfrm>
+          <a:off x="0" y="0"/>
+          <a:ext cx="0" cy="0"/>
+          <a:chOff x="0" y="0"/>
+          <a:chExt cx="0" cy="0"/>
+        </a:xfrm>
+      </p:grpSpPr>
+      <p:sp>
+        <p:nvSpPr>
+          <p:cNvPr id="7" name="Rectangle 6"/>
+          <p:cNvSpPr/>
+          <p:nvPr/>
+        </p:nvSpPr>
+        <p:spPr>
+          <a:xfrm>
+            <a:off x="0" y="0"/>
+            <a:ext cx="9144000" cy="1684460"/>
+          </a:xfrm>
+          <a:prstGeom prst="rect">
+            <a:avLst/>
+          </a:prstGeom>
+        </p:spPr>
+        <p:style>
+          <a:lnRef idx="1">
+            <a:schemeClr val="dk1"/>
+          </a:lnRef>
+          <a:fillRef idx="3">
+            <a:schemeClr val="dk1"/>
+          </a:fillRef>
+          <a:effectRef idx="2">
+            <a:schemeClr val="dk1"/>
+          </a:effectRef>
+          <a:fontRef idx="minor">
+            <a:schemeClr val="lt1"/>
+          </a:fontRef>
+        </p:style>
+        <p:txBody>
+          <a:bodyPr rtlCol="0" anchor="ctr"/>
+          <a:lstStyle/>
+          <a:p>
+            <a:pPr algn="ctr"/>
+            <a:r>
+              <a:rPr lang="en-US" sz="5400" dirty="0" smtClean="0">
+                <a:ln w="18415" cmpd="sng">
+                  <a:solidFill>
+                    <a:srgbClr val="FFFFFF"/>
+                  </a:solidFill>
+                  <a:prstDash val="solid"/>
+                </a:ln>
+                <a:solidFill>
+                  <a:srgbClr val="FFFFFF"/>
+                </a:solidFill>
+                <a:effectLst>
+                  <a:outerShdw blurRad="63500" dir="3600000" algn="tl" rotWithShape="0">
+                    <a:srgbClr val="000000">
+                      <a:alpha val="70000"/>
+                    </a:srgbClr>
+                  </a:outerShdw>
+                </a:effectLst>
+              </a:rPr>
+              <a:t>#! Routes</a:t>
+            </a:r>
+            <a:endParaRPr lang="en-US" sz="5400" dirty="0" smtClean="0">
+              <a:ln w="18415" cmpd="sng">
+                <a:solidFill>
+                  <a:srgbClr val="FFFFFF"/>
+                </a:solidFill>
+                <a:prstDash val="solid"/>
+              </a:ln>
+              <a:solidFill>
+                <a:srgbClr val="FFFFFF"/>
+              </a:solidFill>
+              <a:effectLst>
+                <a:outerShdw blurRad="63500" dir="3600000" algn="tl" rotWithShape="0">
+                  <a:srgbClr val="000000">
+                    <a:alpha val="70000"/>
+                  </a:srgbClr>
+                </a:outerShdw>
+              </a:effectLst>
+            </a:endParaRPr>
           </a:p>
         </p:txBody>
       </p:sp>
@@ -7995,291 +8839,7 @@
     </p:spTree>
     <p:extLst>
       <p:ext uri="{BB962C8B-B14F-4D97-AF65-F5344CB8AC3E}">
-        <p14:creationId xmlns:p14="http://schemas.microsoft.com/office/powerpoint/2010/main" val="1175623307"/>
-      </p:ext>
-    </p:extLst>
-  </p:cSld>
-  <p:clrMapOvr>
-    <a:masterClrMapping/>
-  </p:clrMapOvr>
-  <mc:AlternateContent xmlns:mc="http://schemas.openxmlformats.org/markup-compatibility/2006" xmlns:p14="http://schemas.microsoft.com/office/powerpoint/2010/main">
-    <mc:Choice Requires="p14">
-      <p:transition spd="slow" p14:dur="2000"/>
-    </mc:Choice>
-    <mc:Fallback xmlns="">
-      <p:transition xmlns:p14="http://schemas.microsoft.com/office/powerpoint/2010/main" spd="slow"/>
-    </mc:Fallback>
-  </mc:AlternateContent>
-</p:sld>
-</file>
-
-<file path=ppt/slides/slide9.xml><?xml version="1.0" encoding="utf-8"?>
-<p:sld xmlns:a="http://schemas.openxmlformats.org/drawingml/2006/main" xmlns:r="http://schemas.openxmlformats.org/officeDocument/2006/relationships" xmlns:p="http://schemas.openxmlformats.org/presentationml/2006/main">
-  <p:cSld>
-    <p:spTree>
-      <p:nvGrpSpPr>
-        <p:cNvPr id="1" name=""/>
-        <p:cNvGrpSpPr/>
-        <p:nvPr/>
-      </p:nvGrpSpPr>
-      <p:grpSpPr>
-        <a:xfrm>
-          <a:off x="0" y="0"/>
-          <a:ext cx="0" cy="0"/>
-          <a:chOff x="0" y="0"/>
-          <a:chExt cx="0" cy="0"/>
-        </a:xfrm>
-      </p:grpSpPr>
-      <p:sp>
-        <p:nvSpPr>
-          <p:cNvPr id="7" name="Rectangle 6"/>
-          <p:cNvSpPr/>
-          <p:nvPr/>
-        </p:nvSpPr>
-        <p:spPr>
-          <a:xfrm>
-            <a:off x="0" y="0"/>
-            <a:ext cx="9144000" cy="1684460"/>
-          </a:xfrm>
-          <a:prstGeom prst="rect">
-            <a:avLst/>
-          </a:prstGeom>
-        </p:spPr>
-        <p:style>
-          <a:lnRef idx="1">
-            <a:schemeClr val="dk1"/>
-          </a:lnRef>
-          <a:fillRef idx="3">
-            <a:schemeClr val="dk1"/>
-          </a:fillRef>
-          <a:effectRef idx="2">
-            <a:schemeClr val="dk1"/>
-          </a:effectRef>
-          <a:fontRef idx="minor">
-            <a:schemeClr val="lt1"/>
-          </a:fontRef>
-        </p:style>
-        <p:txBody>
-          <a:bodyPr rtlCol="0" anchor="ctr"/>
-          <a:lstStyle/>
-          <a:p>
-            <a:pPr algn="ctr"/>
-            <a:r>
-              <a:rPr lang="en-US" sz="5400" dirty="0" smtClean="0">
-                <a:ln w="18415" cmpd="sng">
-                  <a:solidFill>
-                    <a:srgbClr val="FFFFFF"/>
-                  </a:solidFill>
-                  <a:prstDash val="solid"/>
-                </a:ln>
-                <a:solidFill>
-                  <a:srgbClr val="FFFFFF"/>
-                </a:solidFill>
-                <a:effectLst>
-                  <a:outerShdw blurRad="63500" dir="3600000" algn="tl" rotWithShape="0">
-                    <a:srgbClr val="000000">
-                      <a:alpha val="70000"/>
-                    </a:srgbClr>
-                  </a:outerShdw>
-                </a:effectLst>
-              </a:rPr>
-              <a:t>HTML5 </a:t>
-            </a:r>
-            <a:r>
-              <a:rPr lang="en-US" sz="5400" dirty="0" err="1" smtClean="0">
-                <a:ln w="18415" cmpd="sng">
-                  <a:solidFill>
-                    <a:srgbClr val="FFFFFF"/>
-                  </a:solidFill>
-                  <a:prstDash val="solid"/>
-                </a:ln>
-                <a:solidFill>
-                  <a:srgbClr val="FFFFFF"/>
-                </a:solidFill>
-                <a:effectLst>
-                  <a:outerShdw blurRad="63500" dir="3600000" algn="tl" rotWithShape="0">
-                    <a:srgbClr val="000000">
-                      <a:alpha val="70000"/>
-                    </a:srgbClr>
-                  </a:outerShdw>
-                </a:effectLst>
-              </a:rPr>
-              <a:t>PushState</a:t>
-            </a:r>
-            <a:endParaRPr lang="en-US" sz="5400" dirty="0" smtClean="0">
-              <a:ln w="18415" cmpd="sng">
-                <a:solidFill>
-                  <a:srgbClr val="FFFFFF"/>
-                </a:solidFill>
-                <a:prstDash val="solid"/>
-              </a:ln>
-              <a:solidFill>
-                <a:srgbClr val="FFFFFF"/>
-              </a:solidFill>
-              <a:effectLst>
-                <a:outerShdw blurRad="63500" dir="3600000" algn="tl" rotWithShape="0">
-                  <a:srgbClr val="000000">
-                    <a:alpha val="70000"/>
-                  </a:srgbClr>
-                </a:outerShdw>
-              </a:effectLst>
-            </a:endParaRPr>
-          </a:p>
-        </p:txBody>
-      </p:sp>
-      <p:grpSp>
-        <p:nvGrpSpPr>
-          <p:cNvPr id="5" name="Group 4"/>
-          <p:cNvGrpSpPr/>
-          <p:nvPr/>
-        </p:nvGrpSpPr>
-        <p:grpSpPr>
-          <a:xfrm>
-            <a:off x="273050" y="1923981"/>
-            <a:ext cx="8597900" cy="2407699"/>
-            <a:chOff x="273050" y="1903807"/>
-            <a:chExt cx="8597900" cy="2407699"/>
-          </a:xfrm>
-        </p:grpSpPr>
-        <p:pic>
-          <p:nvPicPr>
-            <p:cNvPr id="2" name="Picture 1" descr="Screen Shot 2011-11-01 at 8.53.30 PM.png"/>
-            <p:cNvPicPr>
-              <a:picLocks noChangeAspect="1"/>
-            </p:cNvPicPr>
-            <p:nvPr/>
-          </p:nvPicPr>
-          <p:blipFill>
-            <a:blip r:embed="rId2">
-              <a:extLst>
-                <a:ext uri="{28A0092B-C50C-407E-A947-70E740481C1C}">
-                  <a14:useLocalDpi xmlns:a14="http://schemas.microsoft.com/office/drawing/2010/main" val="0"/>
-                </a:ext>
-              </a:extLst>
-            </a:blip>
-            <a:stretch>
-              <a:fillRect/>
-            </a:stretch>
-          </p:blipFill>
-          <p:spPr>
-            <a:xfrm>
-              <a:off x="273050" y="1903807"/>
-              <a:ext cx="8597900" cy="2197100"/>
-            </a:xfrm>
-            <a:prstGeom prst="rect">
-              <a:avLst/>
-            </a:prstGeom>
-          </p:spPr>
-        </p:pic>
-        <p:sp>
-          <p:nvSpPr>
-            <p:cNvPr id="3" name="TextBox 2"/>
-            <p:cNvSpPr txBox="1"/>
-            <p:nvPr/>
-          </p:nvSpPr>
-          <p:spPr>
-            <a:xfrm>
-              <a:off x="2612664" y="3942174"/>
-              <a:ext cx="3918673" cy="369332"/>
-            </a:xfrm>
-            <a:prstGeom prst="rect">
-              <a:avLst/>
-            </a:prstGeom>
-            <a:noFill/>
-          </p:spPr>
-          <p:txBody>
-            <a:bodyPr wrap="none" rtlCol="0">
-              <a:spAutoFit/>
-            </a:bodyPr>
-            <a:lstStyle/>
-            <a:p>
-              <a:r>
-                <a:rPr lang="en-US" b="1" dirty="0" smtClean="0">
-                  <a:hlinkClick r:id="rId3"/>
-                </a:rPr>
-                <a:t>http://diveintohtml5.info/history.html</a:t>
-              </a:r>
-              <a:endParaRPr lang="en-US" b="1" dirty="0" smtClean="0"/>
-            </a:p>
-          </p:txBody>
-        </p:sp>
-      </p:grpSp>
-      <p:sp>
-        <p:nvSpPr>
-          <p:cNvPr id="4" name="TextBox 3"/>
-          <p:cNvSpPr txBox="1"/>
-          <p:nvPr/>
-        </p:nvSpPr>
-        <p:spPr>
-          <a:xfrm>
-            <a:off x="901364" y="5847101"/>
-            <a:ext cx="7341273" cy="584776"/>
-          </a:xfrm>
-          <a:prstGeom prst="rect">
-            <a:avLst/>
-          </a:prstGeom>
-          <a:noFill/>
-        </p:spPr>
-        <p:txBody>
-          <a:bodyPr wrap="none" rtlCol="0">
-            <a:spAutoFit/>
-          </a:bodyPr>
-          <a:lstStyle/>
-          <a:p>
-            <a:r>
-              <a:rPr lang="en-US" sz="3200" b="1" dirty="0" err="1" smtClean="0"/>
-              <a:t>Backbone.history.start</a:t>
-            </a:r>
-            <a:r>
-              <a:rPr lang="en-US" sz="3200" b="1" dirty="0" smtClean="0"/>
-              <a:t>({</a:t>
-            </a:r>
-            <a:r>
-              <a:rPr lang="en-US" sz="3200" b="1" dirty="0" err="1" smtClean="0"/>
-              <a:t>pushState</a:t>
-            </a:r>
-            <a:r>
-              <a:rPr lang="en-US" sz="3200" b="1" dirty="0" smtClean="0"/>
-              <a:t>: true});</a:t>
-            </a:r>
-            <a:endParaRPr lang="en-US" sz="3200" b="1" dirty="0"/>
-          </a:p>
-        </p:txBody>
-      </p:sp>
-      <p:pic>
-        <p:nvPicPr>
-          <p:cNvPr id="6" name="Picture 5" descr="Screen Shot 2011-11-01 at 8.56.38 PM.png"/>
-          <p:cNvPicPr>
-            <a:picLocks noChangeAspect="1"/>
-          </p:cNvPicPr>
-          <p:nvPr/>
-        </p:nvPicPr>
-        <p:blipFill>
-          <a:blip r:embed="rId4">
-            <a:extLst>
-              <a:ext uri="{28A0092B-C50C-407E-A947-70E740481C1C}">
-                <a14:useLocalDpi xmlns:a14="http://schemas.microsoft.com/office/drawing/2010/main" val="0"/>
-              </a:ext>
-            </a:extLst>
-          </a:blip>
-          <a:stretch>
-            <a:fillRect/>
-          </a:stretch>
-        </p:blipFill>
-        <p:spPr>
-          <a:xfrm>
-            <a:off x="2022487" y="4831284"/>
-            <a:ext cx="5099026" cy="710520"/>
-          </a:xfrm>
-          <a:prstGeom prst="rect">
-            <a:avLst/>
-          </a:prstGeom>
-        </p:spPr>
-      </p:pic>
-    </p:spTree>
-    <p:extLst>
-      <p:ext uri="{BB962C8B-B14F-4D97-AF65-F5344CB8AC3E}">
-        <p14:creationId xmlns:p14="http://schemas.microsoft.com/office/powerpoint/2010/main" val="2398771249"/>
+        <p14:creationId xmlns:p14="http://schemas.microsoft.com/office/powerpoint/2010/main" val="219651685"/>
       </p:ext>
     </p:extLst>
   </p:cSld>

</xml_diff>

<commit_message>
saved the file again... don't remember if i changed anything :P
</commit_message>
<xml_diff>
--- a/backbone.presentation.pptx
+++ b/backbone.presentation.pptx
@@ -3618,6 +3618,13 @@
       <p:transition xmlns:p14="http://schemas.microsoft.com/office/powerpoint/2010/main" spd="slow"/>
     </mc:Fallback>
   </mc:AlternateContent>
+  <p:timing>
+    <p:tnLst>
+      <p:par>
+        <p:cTn xmlns:p14="http://schemas.microsoft.com/office/powerpoint/2010/main" id="1" dur="indefinite" restart="never" nodeType="tmRoot"/>
+      </p:par>
+    </p:tnLst>
+  </p:timing>
 </p:sld>
 </file>
 
@@ -3902,6 +3909,13 @@
       <p:transition xmlns:p14="http://schemas.microsoft.com/office/powerpoint/2010/main" spd="slow"/>
     </mc:Fallback>
   </mc:AlternateContent>
+  <p:timing>
+    <p:tnLst>
+      <p:par>
+        <p:cTn xmlns:p14="http://schemas.microsoft.com/office/powerpoint/2010/main" id="1" dur="indefinite" restart="never" nodeType="tmRoot"/>
+      </p:par>
+    </p:tnLst>
+  </p:timing>
 </p:sld>
 </file>
 
@@ -4084,6 +4098,13 @@
       <p:transition xmlns:p14="http://schemas.microsoft.com/office/powerpoint/2010/main" spd="slow"/>
     </mc:Fallback>
   </mc:AlternateContent>
+  <p:timing>
+    <p:tnLst>
+      <p:par>
+        <p:cTn xmlns:p14="http://schemas.microsoft.com/office/powerpoint/2010/main" id="1" dur="indefinite" restart="never" nodeType="tmRoot"/>
+      </p:par>
+    </p:tnLst>
+  </p:timing>
 </p:sld>
 </file>
 
@@ -4228,6 +4249,13 @@
       <p:transition xmlns:p14="http://schemas.microsoft.com/office/powerpoint/2010/main" spd="slow"/>
     </mc:Fallback>
   </mc:AlternateContent>
+  <p:timing>
+    <p:tnLst>
+      <p:par>
+        <p:cTn xmlns:p14="http://schemas.microsoft.com/office/powerpoint/2010/main" id="1" dur="indefinite" restart="never" nodeType="tmRoot"/>
+      </p:par>
+    </p:tnLst>
+  </p:timing>
 </p:sld>
 </file>
 
@@ -4423,6 +4451,13 @@
       <p:transition xmlns:p14="http://schemas.microsoft.com/office/powerpoint/2010/main" spd="slow"/>
     </mc:Fallback>
   </mc:AlternateContent>
+  <p:timing>
+    <p:tnLst>
+      <p:par>
+        <p:cTn xmlns:p14="http://schemas.microsoft.com/office/powerpoint/2010/main" id="1" dur="indefinite" restart="never" nodeType="tmRoot"/>
+      </p:par>
+    </p:tnLst>
+  </p:timing>
 </p:sld>
 </file>
 
@@ -4600,6 +4635,13 @@
       <p:transition xmlns:p14="http://schemas.microsoft.com/office/powerpoint/2010/main" spd="slow"/>
     </mc:Fallback>
   </mc:AlternateContent>
+  <p:timing>
+    <p:tnLst>
+      <p:par>
+        <p:cTn xmlns:p14="http://schemas.microsoft.com/office/powerpoint/2010/main" id="1" dur="indefinite" restart="never" nodeType="tmRoot"/>
+      </p:par>
+    </p:tnLst>
+  </p:timing>
 </p:sld>
 </file>
 
@@ -4790,6 +4832,13 @@
       <p:transition xmlns:p14="http://schemas.microsoft.com/office/powerpoint/2010/main" spd="slow"/>
     </mc:Fallback>
   </mc:AlternateContent>
+  <p:timing>
+    <p:tnLst>
+      <p:par>
+        <p:cTn xmlns:p14="http://schemas.microsoft.com/office/powerpoint/2010/main" id="1" dur="indefinite" restart="never" nodeType="tmRoot"/>
+      </p:par>
+    </p:tnLst>
+  </p:timing>
 </p:sld>
 </file>
 
@@ -4849,7 +4898,7 @@
         <p:spPr>
           <a:xfrm>
             <a:off x="590931" y="781123"/>
-            <a:ext cx="8553069" cy="3288079"/>
+            <a:ext cx="8553069" cy="3380413"/>
           </a:xfrm>
           <a:prstGeom prst="rect">
             <a:avLst/>
@@ -4870,81 +4919,31 @@
               <a:buChar char="•"/>
             </a:pPr>
             <a:r>
-              <a:rPr lang="en-US" sz="2800" b="1" dirty="0" err="1" smtClean="0"/>
-              <a:t>DocumentCloud.github.com</a:t>
-            </a:r>
-            <a:r>
-              <a:rPr lang="en-US" sz="2800" b="1" dirty="0" smtClean="0"/>
-              <a:t>/backbone</a:t>
-            </a:r>
-          </a:p>
-          <a:p>
-            <a:pPr marL="285750" indent="-285750">
-              <a:lnSpc>
-                <a:spcPct val="150000"/>
-              </a:lnSpc>
-              <a:buFont typeface="Arial"/>
-              <a:buChar char="•"/>
-            </a:pPr>
-            <a:r>
-              <a:rPr lang="en-US" sz="2800" b="1" dirty="0" err="1" smtClean="0"/>
-              <a:t>BackboneScreencasts.com</a:t>
-            </a:r>
-            <a:endParaRPr lang="en-US" sz="2800" b="1" dirty="0" smtClean="0"/>
-          </a:p>
-          <a:p>
-            <a:pPr marL="285750" indent="-285750">
-              <a:lnSpc>
-                <a:spcPct val="150000"/>
-              </a:lnSpc>
-              <a:buFont typeface="Arial"/>
-              <a:buChar char="•"/>
-            </a:pPr>
-            <a:r>
-              <a:rPr lang="en-US" sz="2800" b="1" dirty="0" err="1" smtClean="0"/>
-              <a:t>Workshops.Thoughtbot.com</a:t>
-            </a:r>
-            <a:r>
-              <a:rPr lang="en-US" sz="2800" b="1" dirty="0" smtClean="0"/>
-              <a:t>/backbone-js-on-rails </a:t>
-            </a:r>
-          </a:p>
-          <a:p>
-            <a:pPr marL="285750" indent="-285750">
-              <a:lnSpc>
-                <a:spcPct val="150000"/>
-              </a:lnSpc>
-              <a:buFont typeface="Arial"/>
-              <a:buChar char="•"/>
-            </a:pPr>
-            <a:r>
-              <a:rPr lang="en-US" sz="2800" b="1" dirty="0" err="1" smtClean="0"/>
-              <a:t>RecipesWithBackbone.com</a:t>
-            </a:r>
-            <a:endParaRPr lang="en-US" sz="2800" b="1" dirty="0" smtClean="0"/>
-          </a:p>
-          <a:p>
-            <a:pPr marL="285750" indent="-285750">
-              <a:lnSpc>
-                <a:spcPct val="150000"/>
-              </a:lnSpc>
-              <a:buFont typeface="Arial"/>
-              <a:buChar char="•"/>
-            </a:pPr>
-            <a:r>
-              <a:rPr lang="en-US" sz="2800" b="1" dirty="0" err="1"/>
-              <a:t>B</a:t>
-            </a:r>
-            <a:r>
-              <a:rPr lang="en-US" sz="2800" b="1" dirty="0" err="1" smtClean="0"/>
-              <a:t>ackboneTraining.net</a:t>
-            </a:r>
-            <a:r>
-              <a:rPr lang="en-US" sz="2800" b="1" dirty="0" smtClean="0"/>
-              <a:t>/resources      </a:t>
-            </a:r>
-            <a:r>
-              <a:rPr lang="en-US" sz="2400" dirty="0" smtClean="0">
+              <a:rPr lang="en-US" sz="3200" b="1" dirty="0" err="1">
+                <a:solidFill>
+                  <a:srgbClr val="000000"/>
+                </a:solidFill>
+              </a:rPr>
+              <a:t>BackboneTraining.net</a:t>
+            </a:r>
+            <a:r>
+              <a:rPr lang="en-US" sz="3200" b="1" dirty="0">
+                <a:solidFill>
+                  <a:srgbClr val="000000"/>
+                </a:solidFill>
+              </a:rPr>
+              <a:t>/resources</a:t>
+            </a:r>
+            <a:r>
+              <a:rPr lang="en-US" sz="2800" b="1" dirty="0">
+                <a:solidFill>
+                  <a:srgbClr val="000000"/>
+                </a:solidFill>
+              </a:rPr>
+              <a:t>      </a:t>
+            </a:r>
+            <a:r>
+              <a:rPr lang="en-US" sz="2400" dirty="0">
                 <a:solidFill>
                   <a:schemeClr val="tx1">
                     <a:lumMod val="50000"/>
@@ -4955,7 +4954,7 @@
               <a:t>(  </a:t>
             </a:r>
             <a:r>
-              <a:rPr lang="en-US" sz="2400" dirty="0" smtClean="0">
+              <a:rPr lang="en-US" sz="2400" dirty="0">
                 <a:solidFill>
                   <a:schemeClr val="tx1">
                     <a:lumMod val="50000"/>
@@ -4966,7 +4965,7 @@
               </a:rPr>
               <a:t>&lt;---- my site   )</a:t>
             </a:r>
-            <a:endParaRPr lang="en-US" sz="2400" dirty="0" smtClean="0">
+            <a:endParaRPr lang="en-US" sz="2400" dirty="0">
               <a:solidFill>
                 <a:schemeClr val="tx1">
                   <a:lumMod val="50000"/>
@@ -4974,6 +4973,68 @@
                 </a:schemeClr>
               </a:solidFill>
             </a:endParaRPr>
+          </a:p>
+          <a:p>
+            <a:pPr marL="285750" indent="-285750">
+              <a:lnSpc>
+                <a:spcPct val="150000"/>
+              </a:lnSpc>
+              <a:buFont typeface="Arial"/>
+              <a:buChar char="•"/>
+            </a:pPr>
+            <a:r>
+              <a:rPr lang="en-US" sz="2800" dirty="0" err="1" smtClean="0"/>
+              <a:t>DocumentCloud.github.com</a:t>
+            </a:r>
+            <a:r>
+              <a:rPr lang="en-US" sz="2800" dirty="0" smtClean="0"/>
+              <a:t>/backbone</a:t>
+            </a:r>
+          </a:p>
+          <a:p>
+            <a:pPr marL="285750" indent="-285750">
+              <a:lnSpc>
+                <a:spcPct val="150000"/>
+              </a:lnSpc>
+              <a:buFont typeface="Arial"/>
+              <a:buChar char="•"/>
+            </a:pPr>
+            <a:r>
+              <a:rPr lang="en-US" sz="2800" dirty="0" err="1" smtClean="0"/>
+              <a:t>BackboneScreencasts.com</a:t>
+            </a:r>
+            <a:endParaRPr lang="en-US" sz="2800" dirty="0" smtClean="0"/>
+          </a:p>
+          <a:p>
+            <a:pPr marL="285750" indent="-285750">
+              <a:lnSpc>
+                <a:spcPct val="150000"/>
+              </a:lnSpc>
+              <a:buFont typeface="Arial"/>
+              <a:buChar char="•"/>
+            </a:pPr>
+            <a:r>
+              <a:rPr lang="en-US" sz="2800" dirty="0" err="1" smtClean="0"/>
+              <a:t>Workshops.Thoughtbot.com</a:t>
+            </a:r>
+            <a:r>
+              <a:rPr lang="en-US" sz="2800" dirty="0" smtClean="0"/>
+              <a:t>/backbone-js-on-rails </a:t>
+            </a:r>
+          </a:p>
+          <a:p>
+            <a:pPr marL="285750" indent="-285750">
+              <a:lnSpc>
+                <a:spcPct val="150000"/>
+              </a:lnSpc>
+              <a:buFont typeface="Arial"/>
+              <a:buChar char="•"/>
+            </a:pPr>
+            <a:r>
+              <a:rPr lang="en-US" sz="2800" dirty="0" err="1" smtClean="0"/>
+              <a:t>RecipesWithBackbone.com</a:t>
+            </a:r>
+            <a:endParaRPr lang="en-US" sz="2800" dirty="0" smtClean="0"/>
           </a:p>
         </p:txBody>
       </p:sp>
@@ -5112,6 +5173,13 @@
       <p:transition xmlns:p14="http://schemas.microsoft.com/office/powerpoint/2010/main" spd="slow"/>
     </mc:Fallback>
   </mc:AlternateContent>
+  <p:timing>
+    <p:tnLst>
+      <p:par>
+        <p:cTn xmlns:p14="http://schemas.microsoft.com/office/powerpoint/2010/main" id="1" dur="indefinite" restart="never" nodeType="tmRoot"/>
+      </p:par>
+    </p:tnLst>
+  </p:timing>
 </p:sld>
 </file>
 
@@ -5256,6 +5324,13 @@
       <p:transition xmlns:p14="http://schemas.microsoft.com/office/powerpoint/2010/main" spd="slow"/>
     </mc:Fallback>
   </mc:AlternateContent>
+  <p:timing>
+    <p:tnLst>
+      <p:par>
+        <p:cTn xmlns:p14="http://schemas.microsoft.com/office/powerpoint/2010/main" id="1" dur="indefinite" restart="never" nodeType="tmRoot"/>
+      </p:par>
+    </p:tnLst>
+  </p:timing>
 </p:sld>
 </file>
 
@@ -6120,6 +6195,13 @@
       <p:transition xmlns:p14="http://schemas.microsoft.com/office/powerpoint/2010/main" spd="slow"/>
     </mc:Fallback>
   </mc:AlternateContent>
+  <p:timing>
+    <p:tnLst>
+      <p:par>
+        <p:cTn xmlns:p14="http://schemas.microsoft.com/office/powerpoint/2010/main" id="1" dur="indefinite" restart="never" nodeType="tmRoot"/>
+      </p:par>
+    </p:tnLst>
+  </p:timing>
 </p:sld>
 </file>
 
@@ -6517,6 +6599,13 @@
       <p:transition xmlns:p14="http://schemas.microsoft.com/office/powerpoint/2010/main" spd="slow"/>
     </mc:Fallback>
   </mc:AlternateContent>
+  <p:timing>
+    <p:tnLst>
+      <p:par>
+        <p:cTn xmlns:p14="http://schemas.microsoft.com/office/powerpoint/2010/main" id="1" dur="indefinite" restart="never" nodeType="tmRoot"/>
+      </p:par>
+    </p:tnLst>
+  </p:timing>
 </p:sld>
 </file>
 
@@ -7205,6 +7294,13 @@
       <p:transition xmlns:p14="http://schemas.microsoft.com/office/powerpoint/2010/main" spd="slow"/>
     </mc:Fallback>
   </mc:AlternateContent>
+  <p:timing>
+    <p:tnLst>
+      <p:par>
+        <p:cTn xmlns:p14="http://schemas.microsoft.com/office/powerpoint/2010/main" id="1" dur="indefinite" restart="never" nodeType="tmRoot"/>
+      </p:par>
+    </p:tnLst>
+  </p:timing>
 </p:sld>
 </file>
 
@@ -7944,6 +8040,13 @@
       <p:transition xmlns:p14="http://schemas.microsoft.com/office/powerpoint/2010/main" spd="slow"/>
     </mc:Fallback>
   </mc:AlternateContent>
+  <p:timing>
+    <p:tnLst>
+      <p:par>
+        <p:cTn xmlns:p14="http://schemas.microsoft.com/office/powerpoint/2010/main" id="1" dur="indefinite" restart="never" nodeType="tmRoot"/>
+      </p:par>
+    </p:tnLst>
+  </p:timing>
 </p:sld>
 </file>
 
@@ -8129,6 +8232,13 @@
       <p:transition xmlns:p14="http://schemas.microsoft.com/office/powerpoint/2010/main" spd="slow"/>
     </mc:Fallback>
   </mc:AlternateContent>
+  <p:timing>
+    <p:tnLst>
+      <p:par>
+        <p:cTn xmlns:p14="http://schemas.microsoft.com/office/powerpoint/2010/main" id="1" dur="indefinite" restart="never" nodeType="tmRoot"/>
+      </p:par>
+    </p:tnLst>
+  </p:timing>
 </p:sld>
 </file>
 
@@ -8582,6 +8692,13 @@
       <p:transition xmlns:p14="http://schemas.microsoft.com/office/powerpoint/2010/main" spd="slow"/>
     </mc:Fallback>
   </mc:AlternateContent>
+  <p:timing>
+    <p:tnLst>
+      <p:par>
+        <p:cTn xmlns:p14="http://schemas.microsoft.com/office/powerpoint/2010/main" id="1" dur="indefinite" restart="never" nodeType="tmRoot"/>
+      </p:par>
+    </p:tnLst>
+  </p:timing>
 </p:sld>
 </file>
 
@@ -8854,6 +8971,13 @@
       <p:transition xmlns:p14="http://schemas.microsoft.com/office/powerpoint/2010/main" spd="slow"/>
     </mc:Fallback>
   </mc:AlternateContent>
+  <p:timing>
+    <p:tnLst>
+      <p:par>
+        <p:cTn xmlns:p14="http://schemas.microsoft.com/office/powerpoint/2010/main" id="1" dur="indefinite" restart="never" nodeType="tmRoot"/>
+      </p:par>
+    </p:tnLst>
+  </p:timing>
 </p:sld>
 </file>
 

</xml_diff>